<commit_message>
There is some thing wrong with Zombie, Bullet now!
</commit_message>
<xml_diff>
--- a/Zombie Gunship/Assets/Textures/Images.pptx
+++ b/Zombie Gunship/Assets/Textures/Images.pptx
@@ -3211,6 +3211,12 @@
           <a:solidFill>
             <a:srgbClr val="434343"/>
           </a:solidFill>
+          <a:scene3d>
+            <a:camera prst="orthographicFront">
+              <a:rot lat="0" lon="0" rev="5400000"/>
+            </a:camera>
+            <a:lightRig rig="threePt" dir="t"/>
+          </a:scene3d>
         </p:spPr>
         <p:style>
           <a:lnRef idx="1">
@@ -3242,6 +3248,355 @@
               <a:t>Shoot</a:t>
             </a:r>
             <a:endParaRPr lang="en-US" sz="3200" dirty="0">
+              <a:solidFill>
+                <a:srgbClr val="FF0000"/>
+              </a:solidFill>
+              <a:latin typeface="Apple Chancery"/>
+              <a:cs typeface="Apple Chancery"/>
+            </a:endParaRPr>
+          </a:p>
+        </p:txBody>
+      </p:sp>
+      <p:sp>
+        <p:nvSpPr>
+          <p:cNvPr id="12" name="Oval 11"/>
+          <p:cNvSpPr/>
+          <p:nvPr/>
+        </p:nvSpPr>
+        <p:spPr>
+          <a:xfrm>
+            <a:off x="756351" y="2682550"/>
+            <a:ext cx="6849973" cy="1469699"/>
+          </a:xfrm>
+          <a:prstGeom prst="ellipse">
+            <a:avLst/>
+          </a:prstGeom>
+          <a:solidFill>
+            <a:schemeClr val="tx1">
+              <a:lumMod val="75000"/>
+              <a:lumOff val="25000"/>
+            </a:schemeClr>
+          </a:solidFill>
+          <a:scene3d>
+            <a:camera prst="orthographicFront">
+              <a:rot lat="0" lon="0" rev="5400000"/>
+            </a:camera>
+            <a:lightRig rig="threePt" dir="t"/>
+          </a:scene3d>
+        </p:spPr>
+        <p:style>
+          <a:lnRef idx="1">
+            <a:schemeClr val="accent1"/>
+          </a:lnRef>
+          <a:fillRef idx="3">
+            <a:schemeClr val="accent1"/>
+          </a:fillRef>
+          <a:effectRef idx="2">
+            <a:schemeClr val="accent1"/>
+          </a:effectRef>
+          <a:fontRef idx="minor">
+            <a:schemeClr val="lt1"/>
+          </a:fontRef>
+        </p:style>
+        <p:txBody>
+          <a:bodyPr rtlCol="0" anchor="ctr"/>
+          <a:lstStyle/>
+          <a:p>
+            <a:pPr algn="ctr">
+              <a:lnSpc>
+                <a:spcPct val="150000"/>
+              </a:lnSpc>
+            </a:pPr>
+            <a:r>
+              <a:rPr lang="en-US" sz="2400" dirty="0" smtClean="0">
+                <a:solidFill>
+                  <a:srgbClr val="FF0000"/>
+                </a:solidFill>
+                <a:latin typeface="Apple Chancery"/>
+                <a:cs typeface="Apple Chancery"/>
+              </a:rPr>
+              <a:t>Welcome to The Land of Dead!</a:t>
+            </a:r>
+            <a:br>
+              <a:rPr lang="en-US" sz="2400" dirty="0" smtClean="0">
+                <a:solidFill>
+                  <a:srgbClr val="FF0000"/>
+                </a:solidFill>
+                <a:latin typeface="Apple Chancery"/>
+                <a:cs typeface="Apple Chancery"/>
+              </a:rPr>
+            </a:br>
+            <a:r>
+              <a:rPr lang="en-US" sz="2400" dirty="0" smtClean="0">
+                <a:solidFill>
+                  <a:srgbClr val="FF0000"/>
+                </a:solidFill>
+                <a:latin typeface="Apple Chancery"/>
+                <a:cs typeface="Apple Chancery"/>
+              </a:rPr>
+              <a:t>Are you ready for Zombie </a:t>
+            </a:r>
+            <a:r>
+              <a:rPr lang="en-US" sz="2400" dirty="0" err="1" smtClean="0">
+                <a:solidFill>
+                  <a:srgbClr val="FF0000"/>
+                </a:solidFill>
+                <a:latin typeface="Apple Chancery"/>
+                <a:cs typeface="Apple Chancery"/>
+              </a:rPr>
+              <a:t>GunShip</a:t>
+            </a:r>
+            <a:r>
+              <a:rPr lang="en-US" sz="2400" dirty="0" smtClean="0">
+                <a:solidFill>
+                  <a:srgbClr val="FF0000"/>
+                </a:solidFill>
+                <a:latin typeface="Apple Chancery"/>
+                <a:cs typeface="Apple Chancery"/>
+              </a:rPr>
+              <a:t> ?</a:t>
+            </a:r>
+            <a:endParaRPr lang="en-US" sz="2400" dirty="0">
+              <a:solidFill>
+                <a:srgbClr val="FF0000"/>
+              </a:solidFill>
+              <a:latin typeface="Apple Chancery"/>
+              <a:cs typeface="Apple Chancery"/>
+            </a:endParaRPr>
+          </a:p>
+        </p:txBody>
+      </p:sp>
+      <p:sp>
+        <p:nvSpPr>
+          <p:cNvPr id="13" name="Oval 12"/>
+          <p:cNvSpPr/>
+          <p:nvPr/>
+        </p:nvSpPr>
+        <p:spPr>
+          <a:xfrm>
+            <a:off x="6022268" y="4152249"/>
+            <a:ext cx="2454573" cy="984562"/>
+          </a:xfrm>
+          <a:prstGeom prst="ellipse">
+            <a:avLst/>
+          </a:prstGeom>
+          <a:solidFill>
+            <a:schemeClr val="tx1">
+              <a:lumMod val="75000"/>
+              <a:lumOff val="25000"/>
+            </a:schemeClr>
+          </a:solidFill>
+        </p:spPr>
+        <p:style>
+          <a:lnRef idx="1">
+            <a:schemeClr val="accent1"/>
+          </a:lnRef>
+          <a:fillRef idx="3">
+            <a:schemeClr val="accent1"/>
+          </a:fillRef>
+          <a:effectRef idx="2">
+            <a:schemeClr val="accent1"/>
+          </a:effectRef>
+          <a:fontRef idx="minor">
+            <a:schemeClr val="lt1"/>
+          </a:fontRef>
+        </p:style>
+        <p:txBody>
+          <a:bodyPr rtlCol="0" anchor="ctr"/>
+          <a:lstStyle/>
+          <a:p>
+            <a:pPr algn="ctr"/>
+            <a:r>
+              <a:rPr lang="en-US" sz="2500" dirty="0" smtClean="0">
+                <a:solidFill>
+                  <a:srgbClr val="FF0000"/>
+                </a:solidFill>
+                <a:latin typeface="Apple Chancery"/>
+                <a:cs typeface="Apple Chancery"/>
+              </a:rPr>
+              <a:t>Game Over!</a:t>
+            </a:r>
+            <a:endParaRPr lang="en-US" sz="2500" dirty="0">
+              <a:solidFill>
+                <a:srgbClr val="FF0000"/>
+              </a:solidFill>
+              <a:latin typeface="Apple Chancery"/>
+              <a:cs typeface="Apple Chancery"/>
+            </a:endParaRPr>
+          </a:p>
+        </p:txBody>
+      </p:sp>
+      <p:sp>
+        <p:nvSpPr>
+          <p:cNvPr id="16" name="Oval 15"/>
+          <p:cNvSpPr/>
+          <p:nvPr/>
+        </p:nvSpPr>
+        <p:spPr>
+          <a:xfrm>
+            <a:off x="6022268" y="5679023"/>
+            <a:ext cx="2454573" cy="984562"/>
+          </a:xfrm>
+          <a:prstGeom prst="ellipse">
+            <a:avLst/>
+          </a:prstGeom>
+          <a:solidFill>
+            <a:schemeClr val="tx1">
+              <a:lumMod val="75000"/>
+              <a:lumOff val="25000"/>
+            </a:schemeClr>
+          </a:solidFill>
+        </p:spPr>
+        <p:style>
+          <a:lnRef idx="1">
+            <a:schemeClr val="accent1"/>
+          </a:lnRef>
+          <a:fillRef idx="3">
+            <a:schemeClr val="accent1"/>
+          </a:fillRef>
+          <a:effectRef idx="2">
+            <a:schemeClr val="accent1"/>
+          </a:effectRef>
+          <a:fontRef idx="minor">
+            <a:schemeClr val="lt1"/>
+          </a:fontRef>
+        </p:style>
+        <p:txBody>
+          <a:bodyPr rtlCol="0" anchor="ctr"/>
+          <a:lstStyle/>
+          <a:p>
+            <a:pPr algn="ctr"/>
+            <a:r>
+              <a:rPr lang="en-US" sz="2500" dirty="0" smtClean="0">
+                <a:solidFill>
+                  <a:srgbClr val="FF0000"/>
+                </a:solidFill>
+                <a:latin typeface="Apple Chancery"/>
+                <a:cs typeface="Apple Chancery"/>
+              </a:rPr>
+              <a:t>You Win!</a:t>
+            </a:r>
+            <a:endParaRPr lang="en-US" sz="2500" dirty="0">
+              <a:solidFill>
+                <a:srgbClr val="FF0000"/>
+              </a:solidFill>
+              <a:latin typeface="Apple Chancery"/>
+              <a:cs typeface="Apple Chancery"/>
+            </a:endParaRPr>
+          </a:p>
+        </p:txBody>
+      </p:sp>
+      <p:sp>
+        <p:nvSpPr>
+          <p:cNvPr id="18" name="Oval 17"/>
+          <p:cNvSpPr/>
+          <p:nvPr/>
+        </p:nvSpPr>
+        <p:spPr>
+          <a:xfrm>
+            <a:off x="756351" y="3766995"/>
+            <a:ext cx="1412807" cy="741984"/>
+          </a:xfrm>
+          <a:prstGeom prst="ellipse">
+            <a:avLst/>
+          </a:prstGeom>
+          <a:solidFill>
+            <a:schemeClr val="tx1">
+              <a:lumMod val="85000"/>
+              <a:lumOff val="15000"/>
+            </a:schemeClr>
+          </a:solidFill>
+        </p:spPr>
+        <p:style>
+          <a:lnRef idx="1">
+            <a:schemeClr val="accent1"/>
+          </a:lnRef>
+          <a:fillRef idx="3">
+            <a:schemeClr val="accent1"/>
+          </a:fillRef>
+          <a:effectRef idx="2">
+            <a:schemeClr val="accent1"/>
+          </a:effectRef>
+          <a:fontRef idx="minor">
+            <a:schemeClr val="lt1"/>
+          </a:fontRef>
+        </p:style>
+        <p:txBody>
+          <a:bodyPr rtlCol="0" anchor="ctr"/>
+          <a:lstStyle/>
+          <a:p>
+            <a:pPr algn="ctr"/>
+            <a:r>
+              <a:rPr lang="en-US" sz="2500" dirty="0" smtClean="0">
+                <a:solidFill>
+                  <a:srgbClr val="FF0000"/>
+                </a:solidFill>
+                <a:latin typeface="Apple Chancery"/>
+                <a:cs typeface="Apple Chancery"/>
+              </a:rPr>
+              <a:t>Bullet</a:t>
+            </a:r>
+            <a:endParaRPr lang="en-US" sz="2500" dirty="0">
+              <a:solidFill>
+                <a:srgbClr val="FF0000"/>
+              </a:solidFill>
+              <a:latin typeface="Apple Chancery"/>
+              <a:cs typeface="Apple Chancery"/>
+            </a:endParaRPr>
+          </a:p>
+        </p:txBody>
+      </p:sp>
+      <p:sp>
+        <p:nvSpPr>
+          <p:cNvPr id="19" name="Oval 18"/>
+          <p:cNvSpPr/>
+          <p:nvPr/>
+        </p:nvSpPr>
+        <p:spPr>
+          <a:xfrm>
+            <a:off x="756351" y="4979839"/>
+            <a:ext cx="1412807" cy="741984"/>
+          </a:xfrm>
+          <a:prstGeom prst="ellipse">
+            <a:avLst/>
+          </a:prstGeom>
+          <a:solidFill>
+            <a:schemeClr val="tx1">
+              <a:lumMod val="75000"/>
+              <a:lumOff val="25000"/>
+            </a:schemeClr>
+          </a:solidFill>
+        </p:spPr>
+        <p:style>
+          <a:lnRef idx="1">
+            <a:schemeClr val="accent1"/>
+          </a:lnRef>
+          <a:fillRef idx="3">
+            <a:schemeClr val="accent1"/>
+          </a:fillRef>
+          <a:effectRef idx="2">
+            <a:schemeClr val="accent1"/>
+          </a:effectRef>
+          <a:fontRef idx="minor">
+            <a:schemeClr val="lt1"/>
+          </a:fontRef>
+        </p:style>
+        <p:txBody>
+          <a:bodyPr rtlCol="0" anchor="ctr"/>
+          <a:lstStyle/>
+          <a:p>
+            <a:pPr algn="ctr"/>
+            <a:r>
+              <a:rPr lang="en-US" sz="2400" dirty="0" smtClean="0">
+                <a:solidFill>
+                  <a:srgbClr val="FF0000"/>
+                </a:solidFill>
+                <a:latin typeface="Apple Chancery"/>
+                <a:cs typeface="Apple Chancery"/>
+              </a:rPr>
+              <a:t>Canon</a:t>
+            </a:r>
+            <a:endParaRPr lang="en-US" sz="2400" dirty="0">
               <a:solidFill>
                 <a:srgbClr val="FF0000"/>
               </a:solidFill>

</xml_diff>

<commit_message>
Fix the Explode Function, It take a lot of process so that the smartphone can not run!
</commit_message>
<xml_diff>
--- a/Zombie Gunship/Assets/Textures/Images.pptx
+++ b/Zombie Gunship/Assets/Textures/Images.pptx
@@ -3374,7 +3374,7 @@
         </p:nvSpPr>
         <p:spPr>
           <a:xfrm>
-            <a:off x="6022268" y="4152249"/>
+            <a:off x="6022268" y="2896577"/>
             <a:ext cx="2454573" cy="984562"/>
           </a:xfrm>
           <a:prstGeom prst="ellipse">
@@ -3386,6 +3386,12 @@
               <a:lumOff val="25000"/>
             </a:schemeClr>
           </a:solidFill>
+          <a:scene3d>
+            <a:camera prst="orthographicFront">
+              <a:rot lat="0" lon="0" rev="5400000"/>
+            </a:camera>
+            <a:lightRig rig="threePt" dir="t"/>
+          </a:scene3d>
         </p:spPr>
         <p:style>
           <a:lnRef idx="1">
@@ -3434,7 +3440,7 @@
         </p:nvSpPr>
         <p:spPr>
           <a:xfrm>
-            <a:off x="6022268" y="5679023"/>
+            <a:off x="4923401" y="5051187"/>
             <a:ext cx="2454573" cy="984562"/>
           </a:xfrm>
           <a:prstGeom prst="ellipse">
@@ -3446,6 +3452,12 @@
               <a:lumOff val="25000"/>
             </a:schemeClr>
           </a:solidFill>
+          <a:scene3d>
+            <a:camera prst="orthographicFront">
+              <a:rot lat="0" lon="0" rev="5400000"/>
+            </a:camera>
+            <a:lightRig rig="threePt" dir="t"/>
+          </a:scene3d>
         </p:spPr>
         <p:style>
           <a:lnRef idx="1">
@@ -3506,6 +3518,12 @@
               <a:lumOff val="15000"/>
             </a:schemeClr>
           </a:solidFill>
+          <a:scene3d>
+            <a:camera prst="orthographicFront">
+              <a:rot lat="0" lon="0" rev="5400000"/>
+            </a:camera>
+            <a:lightRig rig="threePt" dir="t"/>
+          </a:scene3d>
         </p:spPr>
         <p:style>
           <a:lnRef idx="1">
@@ -3554,7 +3572,7 @@
         </p:nvSpPr>
         <p:spPr>
           <a:xfrm>
-            <a:off x="756351" y="4979839"/>
+            <a:off x="1484172" y="5179605"/>
             <a:ext cx="1412807" cy="741984"/>
           </a:xfrm>
           <a:prstGeom prst="ellipse">
@@ -3566,6 +3584,12 @@
               <a:lumOff val="25000"/>
             </a:schemeClr>
           </a:solidFill>
+          <a:scene3d>
+            <a:camera prst="orthographicFront">
+              <a:rot lat="0" lon="0" rev="5400000"/>
+            </a:camera>
+            <a:lightRig rig="threePt" dir="t"/>
+          </a:scene3d>
         </p:spPr>
         <p:style>
           <a:lnRef idx="1">

</xml_diff>